<commit_message>
Updated for week 5
</commit_message>
<xml_diff>
--- a/Capstone.pptx
+++ b/Capstone.pptx
@@ -9,6 +9,9 @@
     <p:sldId id="257" r:id="rId3"/>
     <p:sldId id="258" r:id="rId4"/>
     <p:sldId id="259" r:id="rId5"/>
+    <p:sldId id="261" r:id="rId6"/>
+    <p:sldId id="262" r:id="rId7"/>
+    <p:sldId id="263" r:id="rId8"/>
   </p:sldIdLst>
   <p:sldSz cx="12192000" cy="6858000"/>
   <p:notesSz cx="6858000" cy="9144000"/>
@@ -107,6 +110,11 @@
       </a:defRPr>
     </a:lvl9pPr>
   </p:defaultTextStyle>
+  <p:extLst>
+    <p:ext uri="{EFAFB233-063F-42B5-8137-9DF3F51BA10A}">
+      <p15:sldGuideLst xmlns:p15="http://schemas.microsoft.com/office/powerpoint/2012/main"/>
+    </p:ext>
+  </p:extLst>
 </p:presentation>
 </file>
 
@@ -3695,7 +3703,7 @@
           <a:p>
             <a:r>
               <a:rPr lang="en-US" b="1" dirty="0"/>
-              <a:t>Results</a:t>
+              <a:t>Methodology</a:t>
             </a:r>
             <a:endParaRPr lang="en-US" dirty="0"/>
           </a:p>
@@ -3720,7 +3728,7 @@
         <p:spPr/>
         <p:txBody>
           <a:bodyPr>
-            <a:normAutofit/>
+            <a:normAutofit fontScale="92500" lnSpcReduction="20000"/>
           </a:bodyPr>
           <a:lstStyle/>
           <a:p>
@@ -3729,8 +3737,97 @@
             </a:pPr>
             <a:r>
               <a:rPr lang="en-US" dirty="0"/>
-              <a:t>A map will be displayed with an indictor showing the neighborhood and number of restaurants within 500 meters of the center of the neighborhood.  Each neighborhood will receive a color coding for a rating – Green: A large number of restaurants, Yellow: A average number of restaurants, Red: Low number of restaurants.</a:t>
-            </a:r>
+              <a:t>For this project, I focused on trying to find the neighborhood with the most dense food and nightlife venues.  The idea is that this allows someone to experience a </a:t>
+            </a:r>
+            <a:r>
+              <a:rPr lang="en-US" dirty="0" err="1"/>
+              <a:t>varity</a:t>
+            </a:r>
+            <a:r>
+              <a:rPr lang="en-US" dirty="0"/>
+              <a:t> of restaurants all within walking distance.  Once the data is plotted on the map it is easy to determine which areas have the most restaurants. </a:t>
+            </a:r>
+          </a:p>
+          <a:p>
+            <a:pPr marL="0" indent="0">
+              <a:buNone/>
+            </a:pPr>
+            <a:endParaRPr lang="en-US" dirty="0"/>
+          </a:p>
+          <a:p>
+            <a:pPr marL="0" indent="0">
+              <a:buNone/>
+            </a:pPr>
+            <a:r>
+              <a:rPr lang="en-US" dirty="0"/>
+              <a:t>Packages Used:</a:t>
+            </a:r>
+          </a:p>
+          <a:p>
+            <a:pPr marL="457200" lvl="1" indent="0">
+              <a:buNone/>
+            </a:pPr>
+            <a:r>
+              <a:rPr lang="en-US" dirty="0"/>
+              <a:t>pandas</a:t>
+            </a:r>
+          </a:p>
+          <a:p>
+            <a:pPr marL="457200" lvl="1" indent="0">
+              <a:buNone/>
+            </a:pPr>
+            <a:r>
+              <a:rPr lang="en-US" dirty="0" err="1"/>
+              <a:t>numpy</a:t>
+            </a:r>
+            <a:endParaRPr lang="en-US" dirty="0"/>
+          </a:p>
+          <a:p>
+            <a:pPr marL="457200" lvl="1" indent="0">
+              <a:buNone/>
+            </a:pPr>
+            <a:r>
+              <a:rPr lang="en-US" dirty="0" err="1"/>
+              <a:t>json</a:t>
+            </a:r>
+            <a:r>
+              <a:rPr lang="en-US" dirty="0"/>
+              <a:t> </a:t>
+            </a:r>
+          </a:p>
+          <a:p>
+            <a:pPr marL="457200" lvl="1" indent="0">
+              <a:buNone/>
+            </a:pPr>
+            <a:r>
+              <a:rPr lang="en-US" dirty="0" err="1"/>
+              <a:t>geopy.geocoders</a:t>
+            </a:r>
+            <a:endParaRPr lang="en-US" dirty="0"/>
+          </a:p>
+          <a:p>
+            <a:pPr marL="457200" lvl="1" indent="0">
+              <a:buNone/>
+            </a:pPr>
+            <a:r>
+              <a:rPr lang="en-US" dirty="0"/>
+              <a:t>requests</a:t>
+            </a:r>
+          </a:p>
+          <a:p>
+            <a:pPr marL="457200" lvl="1" indent="0">
+              <a:buNone/>
+            </a:pPr>
+            <a:r>
+              <a:rPr lang="en-US" dirty="0"/>
+              <a:t>folium</a:t>
+            </a:r>
+          </a:p>
+          <a:p>
+            <a:pPr marL="0" indent="0">
+              <a:buNone/>
+            </a:pPr>
+            <a:endParaRPr lang="en-US" dirty="0"/>
           </a:p>
           <a:p>
             <a:endParaRPr lang="en-US" dirty="0"/>
@@ -3741,6 +3838,294 @@
     <p:extLst>
       <p:ext uri="{BB962C8B-B14F-4D97-AF65-F5344CB8AC3E}">
         <p14:creationId xmlns:p14="http://schemas.microsoft.com/office/powerpoint/2010/main" val="285629121"/>
+      </p:ext>
+    </p:extLst>
+  </p:cSld>
+  <p:clrMapOvr>
+    <a:masterClrMapping/>
+  </p:clrMapOvr>
+</p:sld>
+</file>
+
+<file path=ppt/slides/slide5.xml><?xml version="1.0" encoding="utf-8"?>
+<p:sld xmlns:a="http://schemas.openxmlformats.org/drawingml/2006/main" xmlns:r="http://schemas.openxmlformats.org/officeDocument/2006/relationships" xmlns:p="http://schemas.openxmlformats.org/presentationml/2006/main">
+  <p:cSld>
+    <p:spTree>
+      <p:nvGrpSpPr>
+        <p:cNvPr id="1" name=""/>
+        <p:cNvGrpSpPr/>
+        <p:nvPr/>
+      </p:nvGrpSpPr>
+      <p:grpSpPr>
+        <a:xfrm>
+          <a:off x="0" y="0"/>
+          <a:ext cx="0" cy="0"/>
+          <a:chOff x="0" y="0"/>
+          <a:chExt cx="0" cy="0"/>
+        </a:xfrm>
+      </p:grpSpPr>
+      <p:sp>
+        <p:nvSpPr>
+          <p:cNvPr id="2" name="Title 1">
+            <a:extLst>
+              <a:ext uri="{FF2B5EF4-FFF2-40B4-BE49-F238E27FC236}">
+                <a16:creationId xmlns:a16="http://schemas.microsoft.com/office/drawing/2014/main" id="{705531A6-8979-EE4C-AC6E-D6F7BDAFE86D}"/>
+              </a:ext>
+            </a:extLst>
+          </p:cNvPr>
+          <p:cNvSpPr>
+            <a:spLocks noGrp="1"/>
+          </p:cNvSpPr>
+          <p:nvPr>
+            <p:ph type="title"/>
+          </p:nvPr>
+        </p:nvSpPr>
+        <p:spPr/>
+        <p:txBody>
+          <a:bodyPr/>
+          <a:lstStyle/>
+          <a:p>
+            <a:r>
+              <a:rPr lang="en-US" b="1" dirty="0"/>
+              <a:t>Results</a:t>
+            </a:r>
+            <a:endParaRPr lang="en-US" dirty="0"/>
+          </a:p>
+        </p:txBody>
+      </p:sp>
+      <p:sp>
+        <p:nvSpPr>
+          <p:cNvPr id="3" name="Content Placeholder 2">
+            <a:extLst>
+              <a:ext uri="{FF2B5EF4-FFF2-40B4-BE49-F238E27FC236}">
+                <a16:creationId xmlns:a16="http://schemas.microsoft.com/office/drawing/2014/main" id="{0608FC90-B25F-9846-B410-088B68FCD370}"/>
+              </a:ext>
+            </a:extLst>
+          </p:cNvPr>
+          <p:cNvSpPr>
+            <a:spLocks noGrp="1"/>
+          </p:cNvSpPr>
+          <p:nvPr>
+            <p:ph idx="1"/>
+          </p:nvPr>
+        </p:nvSpPr>
+        <p:spPr/>
+        <p:txBody>
+          <a:bodyPr>
+            <a:normAutofit/>
+          </a:bodyPr>
+          <a:lstStyle/>
+          <a:p>
+            <a:pPr marL="0" indent="0">
+              <a:buNone/>
+            </a:pPr>
+            <a:r>
+              <a:rPr lang="en-US" dirty="0"/>
+              <a:t>A map will be displayed with an indictor showing the neighborhood and number of restaurants within 500 meters of the center of the neighborhood.  Each neighborhood will receive a color coding for a rating – Green: A large number of restaurants, Yellow: A average number of restaurants, Red: Low number of restaurants.</a:t>
+            </a:r>
+          </a:p>
+          <a:p>
+            <a:pPr marL="0" indent="0">
+              <a:buNone/>
+            </a:pPr>
+            <a:endParaRPr lang="en-US" dirty="0"/>
+          </a:p>
+          <a:p>
+            <a:pPr marL="0" indent="0">
+              <a:buNone/>
+            </a:pPr>
+            <a:endParaRPr lang="en-US" dirty="0"/>
+          </a:p>
+        </p:txBody>
+      </p:sp>
+    </p:spTree>
+    <p:extLst>
+      <p:ext uri="{BB962C8B-B14F-4D97-AF65-F5344CB8AC3E}">
+        <p14:creationId xmlns:p14="http://schemas.microsoft.com/office/powerpoint/2010/main" val="72178697"/>
+      </p:ext>
+    </p:extLst>
+  </p:cSld>
+  <p:clrMapOvr>
+    <a:masterClrMapping/>
+  </p:clrMapOvr>
+</p:sld>
+</file>
+
+<file path=ppt/slides/slide6.xml><?xml version="1.0" encoding="utf-8"?>
+<p:sld xmlns:a="http://schemas.openxmlformats.org/drawingml/2006/main" xmlns:r="http://schemas.openxmlformats.org/officeDocument/2006/relationships" xmlns:p="http://schemas.openxmlformats.org/presentationml/2006/main">
+  <p:cSld>
+    <p:spTree>
+      <p:nvGrpSpPr>
+        <p:cNvPr id="1" name=""/>
+        <p:cNvGrpSpPr/>
+        <p:nvPr/>
+      </p:nvGrpSpPr>
+      <p:grpSpPr>
+        <a:xfrm>
+          <a:off x="0" y="0"/>
+          <a:ext cx="0" cy="0"/>
+          <a:chOff x="0" y="0"/>
+          <a:chExt cx="0" cy="0"/>
+        </a:xfrm>
+      </p:grpSpPr>
+      <p:sp>
+        <p:nvSpPr>
+          <p:cNvPr id="2" name="Title 1">
+            <a:extLst>
+              <a:ext uri="{FF2B5EF4-FFF2-40B4-BE49-F238E27FC236}">
+                <a16:creationId xmlns:a16="http://schemas.microsoft.com/office/drawing/2014/main" id="{705531A6-8979-EE4C-AC6E-D6F7BDAFE86D}"/>
+              </a:ext>
+            </a:extLst>
+          </p:cNvPr>
+          <p:cNvSpPr>
+            <a:spLocks noGrp="1"/>
+          </p:cNvSpPr>
+          <p:nvPr>
+            <p:ph type="title"/>
+          </p:nvPr>
+        </p:nvSpPr>
+        <p:spPr/>
+        <p:txBody>
+          <a:bodyPr/>
+          <a:lstStyle/>
+          <a:p>
+            <a:r>
+              <a:rPr lang="en-US" b="1" dirty="0"/>
+              <a:t>Discussion</a:t>
+            </a:r>
+            <a:endParaRPr lang="en-US" dirty="0"/>
+          </a:p>
+        </p:txBody>
+      </p:sp>
+      <p:sp>
+        <p:nvSpPr>
+          <p:cNvPr id="3" name="Content Placeholder 2">
+            <a:extLst>
+              <a:ext uri="{FF2B5EF4-FFF2-40B4-BE49-F238E27FC236}">
+                <a16:creationId xmlns:a16="http://schemas.microsoft.com/office/drawing/2014/main" id="{0608FC90-B25F-9846-B410-088B68FCD370}"/>
+              </a:ext>
+            </a:extLst>
+          </p:cNvPr>
+          <p:cNvSpPr>
+            <a:spLocks noGrp="1"/>
+          </p:cNvSpPr>
+          <p:nvPr>
+            <p:ph idx="1"/>
+          </p:nvPr>
+        </p:nvSpPr>
+        <p:spPr/>
+        <p:txBody>
+          <a:bodyPr>
+            <a:normAutofit/>
+          </a:bodyPr>
+          <a:lstStyle/>
+          <a:p>
+            <a:pPr marL="0" indent="0">
+              <a:buNone/>
+            </a:pPr>
+            <a:r>
+              <a:rPr lang="en-US" dirty="0"/>
+              <a:t>After reviewing the data it identified the Gold Coast, River North, and Cathedral District as a great location to live.  </a:t>
+            </a:r>
+          </a:p>
+        </p:txBody>
+      </p:sp>
+    </p:spTree>
+    <p:extLst>
+      <p:ext uri="{BB962C8B-B14F-4D97-AF65-F5344CB8AC3E}">
+        <p14:creationId xmlns:p14="http://schemas.microsoft.com/office/powerpoint/2010/main" val="1419222717"/>
+      </p:ext>
+    </p:extLst>
+  </p:cSld>
+  <p:clrMapOvr>
+    <a:masterClrMapping/>
+  </p:clrMapOvr>
+</p:sld>
+</file>
+
+<file path=ppt/slides/slide7.xml><?xml version="1.0" encoding="utf-8"?>
+<p:sld xmlns:a="http://schemas.openxmlformats.org/drawingml/2006/main" xmlns:r="http://schemas.openxmlformats.org/officeDocument/2006/relationships" xmlns:p="http://schemas.openxmlformats.org/presentationml/2006/main">
+  <p:cSld>
+    <p:spTree>
+      <p:nvGrpSpPr>
+        <p:cNvPr id="1" name=""/>
+        <p:cNvGrpSpPr/>
+        <p:nvPr/>
+      </p:nvGrpSpPr>
+      <p:grpSpPr>
+        <a:xfrm>
+          <a:off x="0" y="0"/>
+          <a:ext cx="0" cy="0"/>
+          <a:chOff x="0" y="0"/>
+          <a:chExt cx="0" cy="0"/>
+        </a:xfrm>
+      </p:grpSpPr>
+      <p:sp>
+        <p:nvSpPr>
+          <p:cNvPr id="2" name="Title 1">
+            <a:extLst>
+              <a:ext uri="{FF2B5EF4-FFF2-40B4-BE49-F238E27FC236}">
+                <a16:creationId xmlns:a16="http://schemas.microsoft.com/office/drawing/2014/main" id="{7FE6CE4D-6BF9-3C41-A8D2-BD320CB4B2D4}"/>
+              </a:ext>
+            </a:extLst>
+          </p:cNvPr>
+          <p:cNvSpPr>
+            <a:spLocks noGrp="1"/>
+          </p:cNvSpPr>
+          <p:nvPr>
+            <p:ph type="title"/>
+          </p:nvPr>
+        </p:nvSpPr>
+        <p:spPr/>
+        <p:txBody>
+          <a:bodyPr/>
+          <a:lstStyle/>
+          <a:p>
+            <a:r>
+              <a:rPr lang="en-US" dirty="0"/>
+              <a:t>Conclusion</a:t>
+            </a:r>
+          </a:p>
+        </p:txBody>
+      </p:sp>
+      <p:sp>
+        <p:nvSpPr>
+          <p:cNvPr id="3" name="Content Placeholder 2">
+            <a:extLst>
+              <a:ext uri="{FF2B5EF4-FFF2-40B4-BE49-F238E27FC236}">
+                <a16:creationId xmlns:a16="http://schemas.microsoft.com/office/drawing/2014/main" id="{CFF15E56-F9B7-6741-97C5-10CC137D6CED}"/>
+              </a:ext>
+            </a:extLst>
+          </p:cNvPr>
+          <p:cNvSpPr>
+            <a:spLocks noGrp="1"/>
+          </p:cNvSpPr>
+          <p:nvPr>
+            <p:ph idx="1"/>
+          </p:nvPr>
+        </p:nvSpPr>
+        <p:spPr/>
+        <p:txBody>
+          <a:bodyPr/>
+          <a:lstStyle/>
+          <a:p>
+            <a:pPr marL="0" indent="0">
+              <a:buNone/>
+            </a:pPr>
+            <a:r>
+              <a:rPr lang="en-US" dirty="0"/>
+              <a:t>The Gold Coast, River North, and Cathedral District neighborhoods are all very close.  If you lived in the middle of these three neighborhoods, you would have a large variety of venues to enjoy.</a:t>
+            </a:r>
+          </a:p>
+          <a:p>
+            <a:endParaRPr lang="en-US" dirty="0"/>
+          </a:p>
+        </p:txBody>
+      </p:sp>
+    </p:spTree>
+    <p:extLst>
+      <p:ext uri="{BB962C8B-B14F-4D97-AF65-F5344CB8AC3E}">
+        <p14:creationId xmlns:p14="http://schemas.microsoft.com/office/powerpoint/2010/main" val="3443250150"/>
       </p:ext>
     </p:extLst>
   </p:cSld>

</xml_diff>